<commit_message>
figures for history example
</commit_message>
<xml_diff>
--- a/Loop3D-GSO/TestInstances/GeologyScenarioForTesting.pptx
+++ b/Loop3D-GSO/TestInstances/GeologyScenarioForTesting.pptx
@@ -244,7 +244,7 @@
           <a:p>
             <a:fld id="{F3F0FDFC-A3F0-49EF-9F9E-7E3065794AD8}" type="datetimeFigureOut">
               <a:rPr lang="en-US" smtClean="0"/>
-              <a:t>11/15/2019</a:t>
+              <a:t>10/5/2020</a:t>
             </a:fld>
             <a:endParaRPr lang="en-US"/>
           </a:p>
@@ -414,7 +414,7 @@
           <a:p>
             <a:fld id="{F3F0FDFC-A3F0-49EF-9F9E-7E3065794AD8}" type="datetimeFigureOut">
               <a:rPr lang="en-US" smtClean="0"/>
-              <a:t>11/15/2019</a:t>
+              <a:t>10/5/2020</a:t>
             </a:fld>
             <a:endParaRPr lang="en-US"/>
           </a:p>
@@ -594,7 +594,7 @@
           <a:p>
             <a:fld id="{F3F0FDFC-A3F0-49EF-9F9E-7E3065794AD8}" type="datetimeFigureOut">
               <a:rPr lang="en-US" smtClean="0"/>
-              <a:t>11/15/2019</a:t>
+              <a:t>10/5/2020</a:t>
             </a:fld>
             <a:endParaRPr lang="en-US"/>
           </a:p>
@@ -764,7 +764,7 @@
           <a:p>
             <a:fld id="{F3F0FDFC-A3F0-49EF-9F9E-7E3065794AD8}" type="datetimeFigureOut">
               <a:rPr lang="en-US" smtClean="0"/>
-              <a:t>11/15/2019</a:t>
+              <a:t>10/5/2020</a:t>
             </a:fld>
             <a:endParaRPr lang="en-US"/>
           </a:p>
@@ -1008,7 +1008,7 @@
           <a:p>
             <a:fld id="{F3F0FDFC-A3F0-49EF-9F9E-7E3065794AD8}" type="datetimeFigureOut">
               <a:rPr lang="en-US" smtClean="0"/>
-              <a:t>11/15/2019</a:t>
+              <a:t>10/5/2020</a:t>
             </a:fld>
             <a:endParaRPr lang="en-US"/>
           </a:p>
@@ -1240,7 +1240,7 @@
           <a:p>
             <a:fld id="{F3F0FDFC-A3F0-49EF-9F9E-7E3065794AD8}" type="datetimeFigureOut">
               <a:rPr lang="en-US" smtClean="0"/>
-              <a:t>11/15/2019</a:t>
+              <a:t>10/5/2020</a:t>
             </a:fld>
             <a:endParaRPr lang="en-US"/>
           </a:p>
@@ -1607,7 +1607,7 @@
           <a:p>
             <a:fld id="{F3F0FDFC-A3F0-49EF-9F9E-7E3065794AD8}" type="datetimeFigureOut">
               <a:rPr lang="en-US" smtClean="0"/>
-              <a:t>11/15/2019</a:t>
+              <a:t>10/5/2020</a:t>
             </a:fld>
             <a:endParaRPr lang="en-US"/>
           </a:p>
@@ -1725,7 +1725,7 @@
           <a:p>
             <a:fld id="{F3F0FDFC-A3F0-49EF-9F9E-7E3065794AD8}" type="datetimeFigureOut">
               <a:rPr lang="en-US" smtClean="0"/>
-              <a:t>11/15/2019</a:t>
+              <a:t>10/5/2020</a:t>
             </a:fld>
             <a:endParaRPr lang="en-US"/>
           </a:p>
@@ -1820,7 +1820,7 @@
           <a:p>
             <a:fld id="{F3F0FDFC-A3F0-49EF-9F9E-7E3065794AD8}" type="datetimeFigureOut">
               <a:rPr lang="en-US" smtClean="0"/>
-              <a:t>11/15/2019</a:t>
+              <a:t>10/5/2020</a:t>
             </a:fld>
             <a:endParaRPr lang="en-US"/>
           </a:p>
@@ -2097,7 +2097,7 @@
           <a:p>
             <a:fld id="{F3F0FDFC-A3F0-49EF-9F9E-7E3065794AD8}" type="datetimeFigureOut">
               <a:rPr lang="en-US" smtClean="0"/>
-              <a:t>11/15/2019</a:t>
+              <a:t>10/5/2020</a:t>
             </a:fld>
             <a:endParaRPr lang="en-US"/>
           </a:p>
@@ -2354,7 +2354,7 @@
           <a:p>
             <a:fld id="{F3F0FDFC-A3F0-49EF-9F9E-7E3065794AD8}" type="datetimeFigureOut">
               <a:rPr lang="en-US" smtClean="0"/>
-              <a:t>11/15/2019</a:t>
+              <a:t>10/5/2020</a:t>
             </a:fld>
             <a:endParaRPr lang="en-US"/>
           </a:p>
@@ -2567,7 +2567,7 @@
           <a:p>
             <a:fld id="{F3F0FDFC-A3F0-49EF-9F9E-7E3065794AD8}" type="datetimeFigureOut">
               <a:rPr lang="en-US" smtClean="0"/>
-              <a:t>11/15/2019</a:t>
+              <a:t>10/5/2020</a:t>
             </a:fld>
             <a:endParaRPr lang="en-US"/>
           </a:p>

</xml_diff>